<commit_message>
Powerpoint um lineare Modelle ergänzt.
</commit_message>
<xml_diff>
--- a/ApplicationProject_UmsatzprognoseBäckerei_v2.pptx
+++ b/ApplicationProject_UmsatzprognoseBäckerei_v2.pptx
@@ -5,7 +5,7 @@
     <p:sldMasterId id="2147483648" r:id="rId1"/>
   </p:sldMasterIdLst>
   <p:notesMasterIdLst>
-    <p:notesMasterId r:id="rId22"/>
+    <p:notesMasterId r:id="rId26"/>
   </p:notesMasterIdLst>
   <p:sldIdLst>
     <p:sldId id="256" r:id="rId2"/>
@@ -14,7 +14,7 @@
     <p:sldId id="259" r:id="rId5"/>
     <p:sldId id="260" r:id="rId6"/>
     <p:sldId id="263" r:id="rId7"/>
-    <p:sldId id="264" r:id="rId8"/>
+    <p:sldId id="280" r:id="rId8"/>
     <p:sldId id="265" r:id="rId9"/>
     <p:sldId id="266" r:id="rId10"/>
     <p:sldId id="267" r:id="rId11"/>
@@ -27,7 +27,11 @@
     <p:sldId id="273" r:id="rId18"/>
     <p:sldId id="274" r:id="rId19"/>
     <p:sldId id="271" r:id="rId20"/>
-    <p:sldId id="272" r:id="rId21"/>
+    <p:sldId id="278" r:id="rId21"/>
+    <p:sldId id="279" r:id="rId22"/>
+    <p:sldId id="281" r:id="rId23"/>
+    <p:sldId id="277" r:id="rId24"/>
+    <p:sldId id="272" r:id="rId25"/>
   </p:sldIdLst>
   <p:sldSz cx="12192000" cy="6858000"/>
   <p:notesSz cx="6858000" cy="9144000"/>
@@ -216,7 +220,7 @@
           <a:p>
             <a:fld id="{64EB8CAC-2C73-41BC-842E-00A0647E69E9}" type="datetimeFigureOut">
               <a:rPr lang="de-DE" smtClean="0"/>
-              <a:t>09.06.2020</a:t>
+              <a:t>14.06.2020</a:t>
             </a:fld>
             <a:endParaRPr lang="de-DE"/>
           </a:p>
@@ -483,6 +487,254 @@
 </p:notesMaster>
 </file>
 
+<file path=ppt/notesSlides/notesSlide1.xml><?xml version="1.0" encoding="utf-8"?>
+<p:notes xmlns:a="http://schemas.openxmlformats.org/drawingml/2006/main" xmlns:r="http://schemas.openxmlformats.org/officeDocument/2006/relationships" xmlns:p="http://schemas.openxmlformats.org/presentationml/2006/main">
+  <p:cSld>
+    <p:spTree>
+      <p:nvGrpSpPr>
+        <p:cNvPr id="1" name=""/>
+        <p:cNvGrpSpPr/>
+        <p:nvPr/>
+      </p:nvGrpSpPr>
+      <p:grpSpPr>
+        <a:xfrm>
+          <a:off x="0" y="0"/>
+          <a:ext cx="0" cy="0"/>
+          <a:chOff x="0" y="0"/>
+          <a:chExt cx="0" cy="0"/>
+        </a:xfrm>
+      </p:grpSpPr>
+      <p:sp>
+        <p:nvSpPr>
+          <p:cNvPr id="2" name="Folienbildplatzhalter 1"/>
+          <p:cNvSpPr>
+            <a:spLocks noGrp="1" noRot="1" noChangeAspect="1"/>
+          </p:cNvSpPr>
+          <p:nvPr>
+            <p:ph type="sldImg"/>
+          </p:nvPr>
+        </p:nvSpPr>
+        <p:spPr/>
+      </p:sp>
+      <p:sp>
+        <p:nvSpPr>
+          <p:cNvPr id="3" name="Notizenplatzhalter 2"/>
+          <p:cNvSpPr>
+            <a:spLocks noGrp="1"/>
+          </p:cNvSpPr>
+          <p:nvPr>
+            <p:ph type="body" idx="1"/>
+          </p:nvPr>
+        </p:nvSpPr>
+        <p:spPr/>
+        <p:txBody>
+          <a:bodyPr/>
+          <a:lstStyle/>
+          <a:p>
+            <a:r>
+              <a:rPr lang="de-DE" dirty="0"/>
+              <a:t>In einem nächsten Schritt wird mit der linearen Regression ein traditionelles statistisches Modell zur Prognose der Bäckereiumsätze eingesetzt. Die lineare Regression ist ein sehr einfacher Ansatz für das sog. "überwachte Lernen" (</a:t>
+            </a:r>
+            <a:r>
+              <a:rPr lang="de-DE" dirty="0" err="1"/>
+              <a:t>supervised</a:t>
+            </a:r>
+            <a:r>
+              <a:rPr lang="de-DE" dirty="0"/>
+              <a:t> </a:t>
+            </a:r>
+            <a:r>
+              <a:rPr lang="de-DE" dirty="0" err="1"/>
+              <a:t>learning</a:t>
+            </a:r>
+            <a:r>
+              <a:rPr lang="de-DE" dirty="0"/>
+              <a:t>). Lineare Regressionsmodelle sind insbesondere ein nützliches Werkzeug zur Vorhersage einer quantitativen Output-Variable, die in diesem Fall dem Umsatz pro Tag entspricht. Die Inputvariablen können auch nominal oder ordinal sein. </a:t>
+            </a:r>
+          </a:p>
+          <a:p>
+            <a:endParaRPr lang="de-DE" dirty="0"/>
+          </a:p>
+          <a:p>
+            <a:r>
+              <a:rPr lang="de-DE" dirty="0"/>
+              <a:t>Bei der Anwendung der linearen Regression sind wir in mehreren Stunden vorgegangen. Der erste Schritt bestand daraus, einen Trainings- und Testdatensatz zu erzeugen. Der Trainingsdatensatz beinhaltete die Daten aus den Jahren 2014 – 2017, der Testdatensatz umfasste die Daten aus dem Jahr 2018.</a:t>
+            </a:r>
+          </a:p>
+          <a:p>
+            <a:endParaRPr lang="de-DE" dirty="0"/>
+          </a:p>
+          <a:p>
+            <a:r>
+              <a:rPr lang="de-DE" dirty="0"/>
+              <a:t>Des Weiteren wurden die potentiellen Inputvariablen auf lineare Abhängigkeiten und Multikollinearität untersucht, denn zum einen dürfen für die Erstellung linearer Modelle keine linearen Abhängigkeiten zwischen den einzelnen Variablen bestehen; zum anderen wird die Lösung des Regressionsmodells bei Vorhandensein von Multikollinearität instabil.</a:t>
+            </a:r>
+          </a:p>
+          <a:p>
+            <a:endParaRPr lang="de-DE" dirty="0"/>
+          </a:p>
+          <a:p>
+            <a:r>
+              <a:rPr lang="de-DE" dirty="0"/>
+              <a:t>In einem weiteren Schritt haben wir uns einem der spannendsten Fragen gewidmet: Welche von unseren 37 Inputvariablen sind denn nun am besten geeignet um ein gutes Regressionsmodell zu erhalten? Sind es für alle Warengruppen die gleichen Inputvariablen oder sieht man Unterschiede? Und vor allem, wie wählen wir diese aus? </a:t>
+            </a:r>
+          </a:p>
+          <a:p>
+            <a:endParaRPr lang="de-DE" dirty="0"/>
+          </a:p>
+          <a:p>
+            <a:r>
+              <a:rPr lang="de-DE" dirty="0"/>
+              <a:t>Wir haben zur Auswahl der am besten geeigneten Variablen je Warengruppe zum einen die </a:t>
+            </a:r>
+            <a:r>
+              <a:rPr lang="de-DE" dirty="0" err="1"/>
+              <a:t>best</a:t>
+            </a:r>
+            <a:r>
+              <a:rPr lang="de-DE" dirty="0"/>
+              <a:t> </a:t>
+            </a:r>
+            <a:r>
+              <a:rPr lang="de-DE" dirty="0" err="1"/>
+              <a:t>subset</a:t>
+            </a:r>
+            <a:r>
+              <a:rPr lang="de-DE" dirty="0"/>
+              <a:t> </a:t>
+            </a:r>
+            <a:r>
+              <a:rPr lang="de-DE" dirty="0" err="1"/>
+              <a:t>selection</a:t>
+            </a:r>
+            <a:r>
+              <a:rPr lang="de-DE" dirty="0"/>
+              <a:t> genutzt, zum anderen die </a:t>
+            </a:r>
+            <a:r>
+              <a:rPr lang="de-DE" dirty="0" err="1"/>
+              <a:t>stepwise</a:t>
+            </a:r>
+            <a:r>
+              <a:rPr lang="de-DE" dirty="0"/>
+              <a:t> </a:t>
+            </a:r>
+            <a:r>
+              <a:rPr lang="de-DE" dirty="0" err="1"/>
+              <a:t>selection</a:t>
+            </a:r>
+            <a:r>
+              <a:rPr lang="de-DE" dirty="0"/>
+              <a:t> und dabei sowohl </a:t>
+            </a:r>
+            <a:r>
+              <a:rPr lang="de-DE" dirty="0" err="1"/>
+              <a:t>forward</a:t>
+            </a:r>
+            <a:r>
+              <a:rPr lang="de-DE" dirty="0"/>
+              <a:t> als auch </a:t>
+            </a:r>
+            <a:r>
+              <a:rPr lang="de-DE" dirty="0" err="1"/>
+              <a:t>backward</a:t>
+            </a:r>
+            <a:r>
+              <a:rPr lang="de-DE" dirty="0"/>
+              <a:t>-Vorgehen berücksichtigt.</a:t>
+            </a:r>
+          </a:p>
+          <a:p>
+            <a:endParaRPr lang="de-DE" dirty="0"/>
+          </a:p>
+          <a:p>
+            <a:r>
+              <a:rPr lang="de-DE" dirty="0"/>
+              <a:t>Die verschiedenen Verfahren führten mitunter zu unterschiedlichen Vorschlägen bzgl. der einzubeziehenden Variablen, weshalb für jeder Warengruppe unterschiedliche Variablen einbezogen wurden, sowohl hinsichtlich der Anzahl als auch inhaltlich und somit natürlich auch unterschiedliche Modelle erstellt wurden. Diese Modelle haben wir dann wiederum anhand vorher definierter Gütekriterien miteinander verglichen und für jede Warengruppe das beste Modell ausgewählt.</a:t>
+            </a:r>
+          </a:p>
+          <a:p>
+            <a:endParaRPr lang="de-DE" dirty="0"/>
+          </a:p>
+          <a:p>
+            <a:r>
+              <a:rPr lang="de-DE" dirty="0"/>
+              <a:t>Wir haben bei der Auswahl der Modelle festgestellt, dass die einzubeziehenden Variablen mitunter stark voneinander abweichen, wenn man die unterschiedlichen Warengruppen betrachtet. Zudem performen Regressionsmodelle insgesamt für die unterschiedlichen Warengruppen unterschiedlich gut.</a:t>
+            </a:r>
+          </a:p>
+          <a:p>
+            <a:endParaRPr lang="de-DE" dirty="0"/>
+          </a:p>
+          <a:p>
+            <a:r>
+              <a:rPr lang="de-DE" dirty="0"/>
+              <a:t>Dann fällt auf, dass die Schätzer für die Warengruppe 1 und 3 offenbar systematisch zu niedrig sind, weil die mittlere relative Abweichung bei -8% liegt. Warengruppe 4 wird dagegen konsequent zu hoch geschätzt. Für die Warengruppen 2 und 5 liegt der Wert näher an Null bzw. ist gleich 0.</a:t>
+            </a:r>
+          </a:p>
+          <a:p>
+            <a:endParaRPr lang="de-DE" dirty="0"/>
+          </a:p>
+          <a:p>
+            <a:r>
+              <a:rPr lang="de-DE" dirty="0"/>
+              <a:t>Und der mittlere gewichtete Absolutwert der relativen Abweichung (WAPE), den wir vorrangig als Güte-Kriterium im Auge haben, zeigt den niedrigsten Wert für Warengruppe 2, gefolgt von Warengruppe 5. Ähnliche Ergebnisse hatten wir auch mit dem besten naiven Modell erzielt: Dort konnten mit dem erweiterten gleitenden Durchschnitt der letzten 4 Wochen- bzw. Wochenendtage die besten Ergebnisse für die Warengruppen insgesamt erzielt werden und für die Warengruppe 2 lag der WAPE ebenfalls bei 11.</a:t>
+            </a:r>
+          </a:p>
+          <a:p>
+            <a:endParaRPr lang="de-DE" dirty="0"/>
+          </a:p>
+          <a:p>
+            <a:r>
+              <a:rPr lang="de-DE" dirty="0"/>
+              <a:t>Wir widmen uns nun den Verfahren aus dem Bereich </a:t>
+            </a:r>
+            <a:r>
+              <a:rPr lang="de-DE" dirty="0" err="1"/>
+              <a:t>Machine</a:t>
+            </a:r>
+            <a:r>
+              <a:rPr lang="de-DE" dirty="0"/>
+              <a:t> Learning und Deep Learning und wollen rausfinden, ob sich damit noch bessere Ergebnisse erzielen lassen.</a:t>
+            </a:r>
+          </a:p>
+        </p:txBody>
+      </p:sp>
+      <p:sp>
+        <p:nvSpPr>
+          <p:cNvPr id="4" name="Foliennummernplatzhalter 3"/>
+          <p:cNvSpPr>
+            <a:spLocks noGrp="1"/>
+          </p:cNvSpPr>
+          <p:nvPr>
+            <p:ph type="sldNum" sz="quarter" idx="5"/>
+          </p:nvPr>
+        </p:nvSpPr>
+        <p:spPr/>
+        <p:txBody>
+          <a:bodyPr/>
+          <a:lstStyle/>
+          <a:p>
+            <a:fld id="{487B24B3-5E55-4E94-9D0B-91EB239BE60F}" type="slidenum">
+              <a:rPr lang="de-DE" smtClean="0"/>
+              <a:t>6</a:t>
+            </a:fld>
+            <a:endParaRPr lang="de-DE"/>
+          </a:p>
+        </p:txBody>
+      </p:sp>
+    </p:spTree>
+    <p:extLst>
+      <p:ext uri="{BB962C8B-B14F-4D97-AF65-F5344CB8AC3E}">
+        <p14:creationId xmlns:p14="http://schemas.microsoft.com/office/powerpoint/2010/main" val="1571678819"/>
+      </p:ext>
+    </p:extLst>
+  </p:cSld>
+  <p:clrMapOvr>
+    <a:masterClrMapping/>
+  </p:clrMapOvr>
+</p:notes>
+</file>
+
 <file path=ppt/slideLayouts/slideLayout1.xml><?xml version="1.0" encoding="utf-8"?>
 <p:sldLayout xmlns:a="http://schemas.openxmlformats.org/drawingml/2006/main" xmlns:r="http://schemas.openxmlformats.org/officeDocument/2006/relationships" xmlns:p="http://schemas.openxmlformats.org/presentationml/2006/main" type="title" preserve="1">
   <p:cSld name="Titelfolie">
@@ -630,7 +882,7 @@
           <a:p>
             <a:fld id="{B6932020-A466-4CD7-88C1-F34D58D43DBC}" type="datetime1">
               <a:rPr lang="de-DE" smtClean="0"/>
-              <a:t>09.06.2020</a:t>
+              <a:t>14.06.2020</a:t>
             </a:fld>
             <a:endParaRPr lang="de-DE"/>
           </a:p>
@@ -831,7 +1083,7 @@
           <a:p>
             <a:fld id="{E8B25B24-51C9-4699-8A4D-D7C884CE4BEB}" type="datetime1">
               <a:rPr lang="de-DE" smtClean="0"/>
-              <a:t>09.06.2020</a:t>
+              <a:t>14.06.2020</a:t>
             </a:fld>
             <a:endParaRPr lang="de-DE"/>
           </a:p>
@@ -1042,7 +1294,7 @@
           <a:p>
             <a:fld id="{D87FA873-C8E6-4235-9F92-6AB3BEDADCE2}" type="datetime1">
               <a:rPr lang="de-DE" smtClean="0"/>
-              <a:t>09.06.2020</a:t>
+              <a:t>14.06.2020</a:t>
             </a:fld>
             <a:endParaRPr lang="de-DE"/>
           </a:p>
@@ -1243,7 +1495,7 @@
           <a:p>
             <a:fld id="{15AB50BE-E56B-4057-9942-9CFA8D877CB5}" type="datetime1">
               <a:rPr lang="de-DE" smtClean="0"/>
-              <a:t>09.06.2020</a:t>
+              <a:t>14.06.2020</a:t>
             </a:fld>
             <a:endParaRPr lang="de-DE"/>
           </a:p>
@@ -1521,7 +1773,7 @@
           <a:p>
             <a:fld id="{1EE6F005-3080-4F28-90DA-B2092FABA75A}" type="datetime1">
               <a:rPr lang="de-DE" smtClean="0"/>
-              <a:t>09.06.2020</a:t>
+              <a:t>14.06.2020</a:t>
             </a:fld>
             <a:endParaRPr lang="de-DE"/>
           </a:p>
@@ -1789,7 +2041,7 @@
           <a:p>
             <a:fld id="{DB5437FA-8DD9-4D71-92E7-116D6DABFD5C}" type="datetime1">
               <a:rPr lang="de-DE" smtClean="0"/>
-              <a:t>09.06.2020</a:t>
+              <a:t>14.06.2020</a:t>
             </a:fld>
             <a:endParaRPr lang="de-DE"/>
           </a:p>
@@ -2204,7 +2456,7 @@
           <a:p>
             <a:fld id="{E3C31C1D-4101-4BD3-A6A7-9AD314156F65}" type="datetime1">
               <a:rPr lang="de-DE" smtClean="0"/>
-              <a:t>09.06.2020</a:t>
+              <a:t>14.06.2020</a:t>
             </a:fld>
             <a:endParaRPr lang="de-DE"/>
           </a:p>
@@ -2348,7 +2600,7 @@
           <a:p>
             <a:fld id="{855683AA-232C-44A6-8647-15C228F86A7E}" type="datetime1">
               <a:rPr lang="de-DE" smtClean="0"/>
-              <a:t>09.06.2020</a:t>
+              <a:t>14.06.2020</a:t>
             </a:fld>
             <a:endParaRPr lang="de-DE"/>
           </a:p>
@@ -2464,7 +2716,7 @@
           <a:p>
             <a:fld id="{BF8036BA-1230-4B67-9016-04F2CF2EF38C}" type="datetime1">
               <a:rPr lang="de-DE" smtClean="0"/>
-              <a:t>09.06.2020</a:t>
+              <a:t>14.06.2020</a:t>
             </a:fld>
             <a:endParaRPr lang="de-DE"/>
           </a:p>
@@ -2778,7 +3030,7 @@
           <a:p>
             <a:fld id="{C705D9ED-1137-4454-B1B1-62A39904138B}" type="datetime1">
               <a:rPr lang="de-DE" smtClean="0"/>
-              <a:t>09.06.2020</a:t>
+              <a:t>14.06.2020</a:t>
             </a:fld>
             <a:endParaRPr lang="de-DE"/>
           </a:p>
@@ -3069,7 +3321,7 @@
           <a:p>
             <a:fld id="{A795C217-277F-4F85-8043-E43C93B3A3DF}" type="datetime1">
               <a:rPr lang="de-DE" smtClean="0"/>
-              <a:t>09.06.2020</a:t>
+              <a:t>14.06.2020</a:t>
             </a:fld>
             <a:endParaRPr lang="de-DE"/>
           </a:p>
@@ -3313,7 +3565,7 @@
           <a:p>
             <a:fld id="{12141198-C8E7-43D4-976D-3793ADFF8918}" type="datetime1">
               <a:rPr lang="de-DE" smtClean="0"/>
-              <a:t>09.06.2020</a:t>
+              <a:t>14.06.2020</a:t>
             </a:fld>
             <a:endParaRPr lang="de-DE"/>
           </a:p>
@@ -5581,12 +5833,47 @@
           </a:p>
         </p:txBody>
       </p:sp>
+      <p:sp>
+        <p:nvSpPr>
+          <p:cNvPr id="9" name="Titel 1">
+            <a:extLst>
+              <a:ext uri="{FF2B5EF4-FFF2-40B4-BE49-F238E27FC236}">
+                <a16:creationId xmlns:a16="http://schemas.microsoft.com/office/drawing/2014/main" id="{605F0B5C-04B5-4DC7-AB62-259843635722}"/>
+              </a:ext>
+            </a:extLst>
+          </p:cNvPr>
+          <p:cNvSpPr>
+            <a:spLocks noGrp="1"/>
+          </p:cNvSpPr>
+          <p:nvPr>
+            <p:ph type="title"/>
+          </p:nvPr>
+        </p:nvSpPr>
+        <p:spPr>
+          <a:xfrm>
+            <a:off x="92476" y="1"/>
+            <a:ext cx="10997556" cy="976544"/>
+          </a:xfrm>
+        </p:spPr>
+        <p:txBody>
+          <a:bodyPr>
+            <a:normAutofit/>
+          </a:bodyPr>
+          <a:lstStyle/>
+          <a:p>
+            <a:r>
+              <a:rPr lang="de-DE" sz="3600" dirty="0"/>
+              <a:t>Anhang – Lineare Regression – Beste Teilmengenauswahl</a:t>
+            </a:r>
+          </a:p>
+        </p:txBody>
+      </p:sp>
       <p:pic>
         <p:nvPicPr>
-          <p:cNvPr id="2" name="Grafik 1">
-            <a:extLst>
-              <a:ext uri="{FF2B5EF4-FFF2-40B4-BE49-F238E27FC236}">
-                <a16:creationId xmlns:a16="http://schemas.microsoft.com/office/drawing/2014/main" id="{E3FF49E8-B53B-4277-91D2-56F085FDD7CE}"/>
+          <p:cNvPr id="3" name="Grafik 2">
+            <a:extLst>
+              <a:ext uri="{FF2B5EF4-FFF2-40B4-BE49-F238E27FC236}">
+                <a16:creationId xmlns:a16="http://schemas.microsoft.com/office/drawing/2014/main" id="{ECC2C405-8A5E-4330-851B-C65431592049}"/>
               </a:ext>
             </a:extLst>
           </p:cNvPr>
@@ -5603,8 +5890,8 @@
         </p:blipFill>
         <p:spPr>
           <a:xfrm>
-            <a:off x="1583923" y="539447"/>
-            <a:ext cx="9226951" cy="5908977"/>
+            <a:off x="1252537" y="881795"/>
+            <a:ext cx="9686925" cy="5686425"/>
           </a:xfrm>
           <a:prstGeom prst="rect">
             <a:avLst/>
@@ -5613,34 +5900,60 @@
       </p:pic>
       <p:sp>
         <p:nvSpPr>
-          <p:cNvPr id="9" name="Titel 1">
-            <a:extLst>
-              <a:ext uri="{FF2B5EF4-FFF2-40B4-BE49-F238E27FC236}">
-                <a16:creationId xmlns:a16="http://schemas.microsoft.com/office/drawing/2014/main" id="{605F0B5C-04B5-4DC7-AB62-259843635722}"/>
-              </a:ext>
-            </a:extLst>
-          </p:cNvPr>
-          <p:cNvSpPr>
-            <a:spLocks noGrp="1"/>
-          </p:cNvSpPr>
-          <p:nvPr>
-            <p:ph type="title"/>
-          </p:nvPr>
+          <p:cNvPr id="7" name="Interaktive Schaltfläche: Nächste(r) oder Weiter 6">
+            <a:hlinkClick r:id="rId3" action="ppaction://hlinksldjump" highlightClick="1"/>
+            <a:extLst>
+              <a:ext uri="{FF2B5EF4-FFF2-40B4-BE49-F238E27FC236}">
+                <a16:creationId xmlns:a16="http://schemas.microsoft.com/office/drawing/2014/main" id="{6D2EC8F3-E0FA-4A9F-8CBB-EC1720BB0570}"/>
+              </a:ext>
+            </a:extLst>
+          </p:cNvPr>
+          <p:cNvSpPr/>
+          <p:nvPr/>
         </p:nvSpPr>
         <p:spPr>
           <a:xfrm>
-            <a:off x="92476" y="1"/>
-            <a:ext cx="10515600" cy="976544"/>
+            <a:off x="332537" y="6142892"/>
+            <a:ext cx="505662" cy="396020"/>
           </a:xfrm>
+          <a:prstGeom prst="actionButtonForwardNext">
+            <a:avLst/>
+          </a:prstGeom>
+          <a:solidFill>
+            <a:schemeClr val="bg1">
+              <a:lumMod val="85000"/>
+            </a:schemeClr>
+          </a:solidFill>
+          <a:ln>
+            <a:solidFill>
+              <a:schemeClr val="bg2">
+                <a:lumMod val="90000"/>
+              </a:schemeClr>
+            </a:solidFill>
+          </a:ln>
         </p:spPr>
-        <p:txBody>
-          <a:bodyPr/>
-          <a:lstStyle/>
-          <a:p>
-            <a:r>
-              <a:rPr lang="de-DE" dirty="0"/>
-              <a:t>Anhang</a:t>
-            </a:r>
+        <p:style>
+          <a:lnRef idx="2">
+            <a:schemeClr val="accent1">
+              <a:shade val="50000"/>
+            </a:schemeClr>
+          </a:lnRef>
+          <a:fillRef idx="1">
+            <a:schemeClr val="accent1"/>
+          </a:fillRef>
+          <a:effectRef idx="0">
+            <a:schemeClr val="accent1"/>
+          </a:effectRef>
+          <a:fontRef idx="minor">
+            <a:schemeClr val="lt1"/>
+          </a:fontRef>
+        </p:style>
+        <p:txBody>
+          <a:bodyPr rtlCol="0" anchor="ctr"/>
+          <a:lstStyle/>
+          <a:p>
+            <a:pPr algn="ctr"/>
+            <a:endParaRPr lang="de-DE"/>
           </a:p>
         </p:txBody>
       </p:sp>
@@ -5763,15 +6076,23 @@
           <a:p>
             <a:r>
               <a:rPr lang="de-DE" dirty="0"/>
-              <a:t>Wir haben ein </a:t>
+              <a:t>Wir haben unterschiedliche </a:t>
             </a:r>
             <a:r>
               <a:rPr lang="de-DE" b="1" dirty="0"/>
-              <a:t>Prognosemodell entworfen</a:t>
-            </a:r>
-            <a:r>
-              <a:rPr lang="de-DE" dirty="0"/>
-              <a:t>, das Bäckereien eine bessere Planungsgrundlage bietet.</a:t>
+              <a:t>Prognosemodelle entworfen</a:t>
+            </a:r>
+            <a:r>
+              <a:rPr lang="de-DE" dirty="0"/>
+              <a:t>, die Bäckereien eine bessere Planungsgrundlage </a:t>
+            </a:r>
+            <a:r>
+              <a:rPr lang="de-DE" dirty="0" err="1"/>
+              <a:t>bietensollen</a:t>
+            </a:r>
+            <a:r>
+              <a:rPr lang="de-DE" dirty="0"/>
+              <a:t>.</a:t>
             </a:r>
           </a:p>
           <a:p>
@@ -5971,6 +6292,789 @@
           </a:xfrm>
         </p:spPr>
         <p:txBody>
+          <a:bodyPr>
+            <a:normAutofit fontScale="90000"/>
+          </a:bodyPr>
+          <a:lstStyle/>
+          <a:p>
+            <a:r>
+              <a:rPr lang="de-DE" dirty="0"/>
+              <a:t>Anhang – Lineare Regression - Vorwärtsauswahl</a:t>
+            </a:r>
+          </a:p>
+        </p:txBody>
+      </p:sp>
+      <p:sp>
+        <p:nvSpPr>
+          <p:cNvPr id="7" name="Interaktive Schaltfläche: Nächste(r) oder Weiter 6">
+            <a:hlinkClick r:id="rId2" action="ppaction://hlinksldjump" highlightClick="1"/>
+            <a:extLst>
+              <a:ext uri="{FF2B5EF4-FFF2-40B4-BE49-F238E27FC236}">
+                <a16:creationId xmlns:a16="http://schemas.microsoft.com/office/drawing/2014/main" id="{6D2EC8F3-E0FA-4A9F-8CBB-EC1720BB0570}"/>
+              </a:ext>
+            </a:extLst>
+          </p:cNvPr>
+          <p:cNvSpPr/>
+          <p:nvPr/>
+        </p:nvSpPr>
+        <p:spPr>
+          <a:xfrm>
+            <a:off x="332537" y="6142892"/>
+            <a:ext cx="505662" cy="396020"/>
+          </a:xfrm>
+          <a:prstGeom prst="actionButtonForwardNext">
+            <a:avLst/>
+          </a:prstGeom>
+          <a:solidFill>
+            <a:schemeClr val="bg1">
+              <a:lumMod val="85000"/>
+            </a:schemeClr>
+          </a:solidFill>
+          <a:ln>
+            <a:solidFill>
+              <a:schemeClr val="bg2">
+                <a:lumMod val="90000"/>
+              </a:schemeClr>
+            </a:solidFill>
+          </a:ln>
+        </p:spPr>
+        <p:style>
+          <a:lnRef idx="2">
+            <a:schemeClr val="accent1">
+              <a:shade val="50000"/>
+            </a:schemeClr>
+          </a:lnRef>
+          <a:fillRef idx="1">
+            <a:schemeClr val="accent1"/>
+          </a:fillRef>
+          <a:effectRef idx="0">
+            <a:schemeClr val="accent1"/>
+          </a:effectRef>
+          <a:fontRef idx="minor">
+            <a:schemeClr val="lt1"/>
+          </a:fontRef>
+        </p:style>
+        <p:txBody>
+          <a:bodyPr rtlCol="0" anchor="ctr"/>
+          <a:lstStyle/>
+          <a:p>
+            <a:pPr algn="ctr"/>
+            <a:endParaRPr lang="de-DE"/>
+          </a:p>
+        </p:txBody>
+      </p:sp>
+      <p:pic>
+        <p:nvPicPr>
+          <p:cNvPr id="2" name="Grafik 1">
+            <a:extLst>
+              <a:ext uri="{FF2B5EF4-FFF2-40B4-BE49-F238E27FC236}">
+                <a16:creationId xmlns:a16="http://schemas.microsoft.com/office/drawing/2014/main" id="{F3D5C02E-8510-4883-8434-1A34B07B20F0}"/>
+              </a:ext>
+            </a:extLst>
+          </p:cNvPr>
+          <p:cNvPicPr>
+            <a:picLocks noChangeAspect="1"/>
+          </p:cNvPicPr>
+          <p:nvPr/>
+        </p:nvPicPr>
+        <p:blipFill>
+          <a:blip r:embed="rId3"/>
+          <a:stretch>
+            <a:fillRect/>
+          </a:stretch>
+        </p:blipFill>
+        <p:spPr>
+          <a:xfrm>
+            <a:off x="1147762" y="1033462"/>
+            <a:ext cx="9896475" cy="5505450"/>
+          </a:xfrm>
+          <a:prstGeom prst="rect">
+            <a:avLst/>
+          </a:prstGeom>
+        </p:spPr>
+      </p:pic>
+    </p:spTree>
+    <p:extLst>
+      <p:ext uri="{BB962C8B-B14F-4D97-AF65-F5344CB8AC3E}">
+        <p14:creationId xmlns:p14="http://schemas.microsoft.com/office/powerpoint/2010/main" val="4048320831"/>
+      </p:ext>
+    </p:extLst>
+  </p:cSld>
+  <p:clrMapOvr>
+    <a:masterClrMapping/>
+  </p:clrMapOvr>
+</p:sld>
+</file>
+
+<file path=ppt/slides/slide21.xml><?xml version="1.0" encoding="utf-8"?>
+<p:sld xmlns:a="http://schemas.openxmlformats.org/drawingml/2006/main" xmlns:r="http://schemas.openxmlformats.org/officeDocument/2006/relationships" xmlns:p="http://schemas.openxmlformats.org/presentationml/2006/main">
+  <p:cSld>
+    <p:spTree>
+      <p:nvGrpSpPr>
+        <p:cNvPr id="1" name=""/>
+        <p:cNvGrpSpPr/>
+        <p:nvPr/>
+      </p:nvGrpSpPr>
+      <p:grpSpPr>
+        <a:xfrm>
+          <a:off x="0" y="0"/>
+          <a:ext cx="0" cy="0"/>
+          <a:chOff x="0" y="0"/>
+          <a:chExt cx="0" cy="0"/>
+        </a:xfrm>
+      </p:grpSpPr>
+      <p:sp>
+        <p:nvSpPr>
+          <p:cNvPr id="4" name="Fußzeilenplatzhalter 3">
+            <a:extLst>
+              <a:ext uri="{FF2B5EF4-FFF2-40B4-BE49-F238E27FC236}">
+                <a16:creationId xmlns:a16="http://schemas.microsoft.com/office/drawing/2014/main" id="{16F63B71-9DCA-4E29-A33C-A5817A2E808C}"/>
+              </a:ext>
+            </a:extLst>
+          </p:cNvPr>
+          <p:cNvSpPr>
+            <a:spLocks noGrp="1"/>
+          </p:cNvSpPr>
+          <p:nvPr>
+            <p:ph type="ftr" sz="quarter" idx="11"/>
+          </p:nvPr>
+        </p:nvSpPr>
+        <p:spPr/>
+        <p:txBody>
+          <a:bodyPr/>
+          <a:lstStyle/>
+          <a:p>
+            <a:r>
+              <a:rPr lang="de-DE"/>
+              <a:t>Application Project "Umsatzprognose Bäckerei"</a:t>
+            </a:r>
+          </a:p>
+        </p:txBody>
+      </p:sp>
+      <p:sp>
+        <p:nvSpPr>
+          <p:cNvPr id="5" name="Foliennummernplatzhalter 4">
+            <a:extLst>
+              <a:ext uri="{FF2B5EF4-FFF2-40B4-BE49-F238E27FC236}">
+                <a16:creationId xmlns:a16="http://schemas.microsoft.com/office/drawing/2014/main" id="{3B37C111-C299-456C-AE5F-E0E6F2CA0C65}"/>
+              </a:ext>
+            </a:extLst>
+          </p:cNvPr>
+          <p:cNvSpPr>
+            <a:spLocks noGrp="1"/>
+          </p:cNvSpPr>
+          <p:nvPr>
+            <p:ph type="sldNum" sz="quarter" idx="12"/>
+          </p:nvPr>
+        </p:nvSpPr>
+        <p:spPr/>
+        <p:txBody>
+          <a:bodyPr/>
+          <a:lstStyle/>
+          <a:p>
+            <a:fld id="{9C75FA27-ABA3-44D1-A3BB-EAEC5689F51E}" type="slidenum">
+              <a:rPr lang="de-DE" smtClean="0"/>
+              <a:t>21</a:t>
+            </a:fld>
+            <a:endParaRPr lang="de-DE"/>
+          </a:p>
+        </p:txBody>
+      </p:sp>
+      <p:sp>
+        <p:nvSpPr>
+          <p:cNvPr id="9" name="Titel 1">
+            <a:extLst>
+              <a:ext uri="{FF2B5EF4-FFF2-40B4-BE49-F238E27FC236}">
+                <a16:creationId xmlns:a16="http://schemas.microsoft.com/office/drawing/2014/main" id="{605F0B5C-04B5-4DC7-AB62-259843635722}"/>
+              </a:ext>
+            </a:extLst>
+          </p:cNvPr>
+          <p:cNvSpPr>
+            <a:spLocks noGrp="1"/>
+          </p:cNvSpPr>
+          <p:nvPr>
+            <p:ph type="title"/>
+          </p:nvPr>
+        </p:nvSpPr>
+        <p:spPr>
+          <a:xfrm>
+            <a:off x="92476" y="1"/>
+            <a:ext cx="10515600" cy="976544"/>
+          </a:xfrm>
+        </p:spPr>
+        <p:txBody>
+          <a:bodyPr>
+            <a:normAutofit fontScale="90000"/>
+          </a:bodyPr>
+          <a:lstStyle/>
+          <a:p>
+            <a:r>
+              <a:rPr lang="de-DE" dirty="0"/>
+              <a:t>Anhang – Lineare Regression - Rückwärtsauswahl</a:t>
+            </a:r>
+          </a:p>
+        </p:txBody>
+      </p:sp>
+      <p:sp>
+        <p:nvSpPr>
+          <p:cNvPr id="7" name="Interaktive Schaltfläche: Nächste(r) oder Weiter 6">
+            <a:hlinkClick r:id="rId2" action="ppaction://hlinksldjump" highlightClick="1"/>
+            <a:extLst>
+              <a:ext uri="{FF2B5EF4-FFF2-40B4-BE49-F238E27FC236}">
+                <a16:creationId xmlns:a16="http://schemas.microsoft.com/office/drawing/2014/main" id="{6D2EC8F3-E0FA-4A9F-8CBB-EC1720BB0570}"/>
+              </a:ext>
+            </a:extLst>
+          </p:cNvPr>
+          <p:cNvSpPr/>
+          <p:nvPr/>
+        </p:nvSpPr>
+        <p:spPr>
+          <a:xfrm>
+            <a:off x="332537" y="6142892"/>
+            <a:ext cx="505662" cy="396020"/>
+          </a:xfrm>
+          <a:prstGeom prst="actionButtonForwardNext">
+            <a:avLst/>
+          </a:prstGeom>
+          <a:solidFill>
+            <a:schemeClr val="bg1">
+              <a:lumMod val="85000"/>
+            </a:schemeClr>
+          </a:solidFill>
+          <a:ln>
+            <a:solidFill>
+              <a:schemeClr val="bg2">
+                <a:lumMod val="90000"/>
+              </a:schemeClr>
+            </a:solidFill>
+          </a:ln>
+        </p:spPr>
+        <p:style>
+          <a:lnRef idx="2">
+            <a:schemeClr val="accent1">
+              <a:shade val="50000"/>
+            </a:schemeClr>
+          </a:lnRef>
+          <a:fillRef idx="1">
+            <a:schemeClr val="accent1"/>
+          </a:fillRef>
+          <a:effectRef idx="0">
+            <a:schemeClr val="accent1"/>
+          </a:effectRef>
+          <a:fontRef idx="minor">
+            <a:schemeClr val="lt1"/>
+          </a:fontRef>
+        </p:style>
+        <p:txBody>
+          <a:bodyPr rtlCol="0" anchor="ctr"/>
+          <a:lstStyle/>
+          <a:p>
+            <a:pPr algn="ctr"/>
+            <a:endParaRPr lang="de-DE"/>
+          </a:p>
+        </p:txBody>
+      </p:sp>
+      <p:pic>
+        <p:nvPicPr>
+          <p:cNvPr id="3" name="Grafik 2">
+            <a:extLst>
+              <a:ext uri="{FF2B5EF4-FFF2-40B4-BE49-F238E27FC236}">
+                <a16:creationId xmlns:a16="http://schemas.microsoft.com/office/drawing/2014/main" id="{DA64EAD9-5C0A-489E-B9ED-4AD2FB56437D}"/>
+              </a:ext>
+            </a:extLst>
+          </p:cNvPr>
+          <p:cNvPicPr>
+            <a:picLocks noChangeAspect="1"/>
+          </p:cNvPicPr>
+          <p:nvPr/>
+        </p:nvPicPr>
+        <p:blipFill>
+          <a:blip r:embed="rId3"/>
+          <a:stretch>
+            <a:fillRect/>
+          </a:stretch>
+        </p:blipFill>
+        <p:spPr>
+          <a:xfrm>
+            <a:off x="1204912" y="1051835"/>
+            <a:ext cx="9782175" cy="5229225"/>
+          </a:xfrm>
+          <a:prstGeom prst="rect">
+            <a:avLst/>
+          </a:prstGeom>
+        </p:spPr>
+      </p:pic>
+    </p:spTree>
+    <p:extLst>
+      <p:ext uri="{BB962C8B-B14F-4D97-AF65-F5344CB8AC3E}">
+        <p14:creationId xmlns:p14="http://schemas.microsoft.com/office/powerpoint/2010/main" val="4223168594"/>
+      </p:ext>
+    </p:extLst>
+  </p:cSld>
+  <p:clrMapOvr>
+    <a:masterClrMapping/>
+  </p:clrMapOvr>
+</p:sld>
+</file>
+
+<file path=ppt/slides/slide22.xml><?xml version="1.0" encoding="utf-8"?>
+<p:sld xmlns:a="http://schemas.openxmlformats.org/drawingml/2006/main" xmlns:r="http://schemas.openxmlformats.org/officeDocument/2006/relationships" xmlns:p="http://schemas.openxmlformats.org/presentationml/2006/main">
+  <p:cSld>
+    <p:spTree>
+      <p:nvGrpSpPr>
+        <p:cNvPr id="1" name=""/>
+        <p:cNvGrpSpPr/>
+        <p:nvPr/>
+      </p:nvGrpSpPr>
+      <p:grpSpPr>
+        <a:xfrm>
+          <a:off x="0" y="0"/>
+          <a:ext cx="0" cy="0"/>
+          <a:chOff x="0" y="0"/>
+          <a:chExt cx="0" cy="0"/>
+        </a:xfrm>
+      </p:grpSpPr>
+      <p:sp>
+        <p:nvSpPr>
+          <p:cNvPr id="4" name="Fußzeilenplatzhalter 3">
+            <a:extLst>
+              <a:ext uri="{FF2B5EF4-FFF2-40B4-BE49-F238E27FC236}">
+                <a16:creationId xmlns:a16="http://schemas.microsoft.com/office/drawing/2014/main" id="{16F63B71-9DCA-4E29-A33C-A5817A2E808C}"/>
+              </a:ext>
+            </a:extLst>
+          </p:cNvPr>
+          <p:cNvSpPr>
+            <a:spLocks noGrp="1"/>
+          </p:cNvSpPr>
+          <p:nvPr>
+            <p:ph type="ftr" sz="quarter" idx="11"/>
+          </p:nvPr>
+        </p:nvSpPr>
+        <p:spPr/>
+        <p:txBody>
+          <a:bodyPr/>
+          <a:lstStyle/>
+          <a:p>
+            <a:r>
+              <a:rPr lang="de-DE"/>
+              <a:t>Application Project "Umsatzprognose Bäckerei"</a:t>
+            </a:r>
+          </a:p>
+        </p:txBody>
+      </p:sp>
+      <p:sp>
+        <p:nvSpPr>
+          <p:cNvPr id="5" name="Foliennummernplatzhalter 4">
+            <a:extLst>
+              <a:ext uri="{FF2B5EF4-FFF2-40B4-BE49-F238E27FC236}">
+                <a16:creationId xmlns:a16="http://schemas.microsoft.com/office/drawing/2014/main" id="{3B37C111-C299-456C-AE5F-E0E6F2CA0C65}"/>
+              </a:ext>
+            </a:extLst>
+          </p:cNvPr>
+          <p:cNvSpPr>
+            <a:spLocks noGrp="1"/>
+          </p:cNvSpPr>
+          <p:nvPr>
+            <p:ph type="sldNum" sz="quarter" idx="12"/>
+          </p:nvPr>
+        </p:nvSpPr>
+        <p:spPr/>
+        <p:txBody>
+          <a:bodyPr/>
+          <a:lstStyle/>
+          <a:p>
+            <a:fld id="{9C75FA27-ABA3-44D1-A3BB-EAEC5689F51E}" type="slidenum">
+              <a:rPr lang="de-DE" smtClean="0"/>
+              <a:t>22</a:t>
+            </a:fld>
+            <a:endParaRPr lang="de-DE"/>
+          </a:p>
+        </p:txBody>
+      </p:sp>
+      <p:sp>
+        <p:nvSpPr>
+          <p:cNvPr id="9" name="Titel 1">
+            <a:extLst>
+              <a:ext uri="{FF2B5EF4-FFF2-40B4-BE49-F238E27FC236}">
+                <a16:creationId xmlns:a16="http://schemas.microsoft.com/office/drawing/2014/main" id="{605F0B5C-04B5-4DC7-AB62-259843635722}"/>
+              </a:ext>
+            </a:extLst>
+          </p:cNvPr>
+          <p:cNvSpPr>
+            <a:spLocks noGrp="1"/>
+          </p:cNvSpPr>
+          <p:nvPr>
+            <p:ph type="title"/>
+          </p:nvPr>
+        </p:nvSpPr>
+        <p:spPr>
+          <a:xfrm>
+            <a:off x="92476" y="1"/>
+            <a:ext cx="10515600" cy="976544"/>
+          </a:xfrm>
+        </p:spPr>
+        <p:txBody>
+          <a:bodyPr>
+            <a:normAutofit/>
+          </a:bodyPr>
+          <a:lstStyle/>
+          <a:p>
+            <a:r>
+              <a:rPr lang="de-DE" sz="3600" dirty="0"/>
+              <a:t>Anhang – Lineare Regression – Vergleich der Ergebnisse</a:t>
+            </a:r>
+          </a:p>
+        </p:txBody>
+      </p:sp>
+      <p:sp>
+        <p:nvSpPr>
+          <p:cNvPr id="7" name="Interaktive Schaltfläche: Nächste(r) oder Weiter 6">
+            <a:hlinkClick r:id="rId2" action="ppaction://hlinksldjump" highlightClick="1"/>
+            <a:extLst>
+              <a:ext uri="{FF2B5EF4-FFF2-40B4-BE49-F238E27FC236}">
+                <a16:creationId xmlns:a16="http://schemas.microsoft.com/office/drawing/2014/main" id="{6D2EC8F3-E0FA-4A9F-8CBB-EC1720BB0570}"/>
+              </a:ext>
+            </a:extLst>
+          </p:cNvPr>
+          <p:cNvSpPr/>
+          <p:nvPr/>
+        </p:nvSpPr>
+        <p:spPr>
+          <a:xfrm>
+            <a:off x="332537" y="6142892"/>
+            <a:ext cx="505662" cy="396020"/>
+          </a:xfrm>
+          <a:prstGeom prst="actionButtonForwardNext">
+            <a:avLst/>
+          </a:prstGeom>
+          <a:solidFill>
+            <a:schemeClr val="bg1">
+              <a:lumMod val="85000"/>
+            </a:schemeClr>
+          </a:solidFill>
+          <a:ln>
+            <a:solidFill>
+              <a:schemeClr val="bg2">
+                <a:lumMod val="90000"/>
+              </a:schemeClr>
+            </a:solidFill>
+          </a:ln>
+        </p:spPr>
+        <p:style>
+          <a:lnRef idx="2">
+            <a:schemeClr val="accent1">
+              <a:shade val="50000"/>
+            </a:schemeClr>
+          </a:lnRef>
+          <a:fillRef idx="1">
+            <a:schemeClr val="accent1"/>
+          </a:fillRef>
+          <a:effectRef idx="0">
+            <a:schemeClr val="accent1"/>
+          </a:effectRef>
+          <a:fontRef idx="minor">
+            <a:schemeClr val="lt1"/>
+          </a:fontRef>
+        </p:style>
+        <p:txBody>
+          <a:bodyPr rtlCol="0" anchor="ctr"/>
+          <a:lstStyle/>
+          <a:p>
+            <a:pPr algn="ctr"/>
+            <a:endParaRPr lang="de-DE"/>
+          </a:p>
+        </p:txBody>
+      </p:sp>
+      <p:pic>
+        <p:nvPicPr>
+          <p:cNvPr id="2" name="Grafik 1">
+            <a:extLst>
+              <a:ext uri="{FF2B5EF4-FFF2-40B4-BE49-F238E27FC236}">
+                <a16:creationId xmlns:a16="http://schemas.microsoft.com/office/drawing/2014/main" id="{3DF78873-5FA5-4EA9-BEED-6B69013431A2}"/>
+              </a:ext>
+            </a:extLst>
+          </p:cNvPr>
+          <p:cNvPicPr>
+            <a:picLocks noChangeAspect="1"/>
+          </p:cNvPicPr>
+          <p:nvPr/>
+        </p:nvPicPr>
+        <p:blipFill>
+          <a:blip r:embed="rId3"/>
+          <a:stretch>
+            <a:fillRect/>
+          </a:stretch>
+        </p:blipFill>
+        <p:spPr>
+          <a:xfrm>
+            <a:off x="1265638" y="648651"/>
+            <a:ext cx="10084118" cy="6267085"/>
+          </a:xfrm>
+          <a:prstGeom prst="rect">
+            <a:avLst/>
+          </a:prstGeom>
+        </p:spPr>
+      </p:pic>
+    </p:spTree>
+    <p:extLst>
+      <p:ext uri="{BB962C8B-B14F-4D97-AF65-F5344CB8AC3E}">
+        <p14:creationId xmlns:p14="http://schemas.microsoft.com/office/powerpoint/2010/main" val="185563580"/>
+      </p:ext>
+    </p:extLst>
+  </p:cSld>
+  <p:clrMapOvr>
+    <a:masterClrMapping/>
+  </p:clrMapOvr>
+</p:sld>
+</file>
+
+<file path=ppt/slides/slide23.xml><?xml version="1.0" encoding="utf-8"?>
+<p:sld xmlns:a="http://schemas.openxmlformats.org/drawingml/2006/main" xmlns:r="http://schemas.openxmlformats.org/officeDocument/2006/relationships" xmlns:p="http://schemas.openxmlformats.org/presentationml/2006/main">
+  <p:cSld>
+    <p:spTree>
+      <p:nvGrpSpPr>
+        <p:cNvPr id="1" name=""/>
+        <p:cNvGrpSpPr/>
+        <p:nvPr/>
+      </p:nvGrpSpPr>
+      <p:grpSpPr>
+        <a:xfrm>
+          <a:off x="0" y="0"/>
+          <a:ext cx="0" cy="0"/>
+          <a:chOff x="0" y="0"/>
+          <a:chExt cx="0" cy="0"/>
+        </a:xfrm>
+      </p:grpSpPr>
+      <p:sp>
+        <p:nvSpPr>
+          <p:cNvPr id="4" name="Fußzeilenplatzhalter 3">
+            <a:extLst>
+              <a:ext uri="{FF2B5EF4-FFF2-40B4-BE49-F238E27FC236}">
+                <a16:creationId xmlns:a16="http://schemas.microsoft.com/office/drawing/2014/main" id="{16F63B71-9DCA-4E29-A33C-A5817A2E808C}"/>
+              </a:ext>
+            </a:extLst>
+          </p:cNvPr>
+          <p:cNvSpPr>
+            <a:spLocks noGrp="1"/>
+          </p:cNvSpPr>
+          <p:nvPr>
+            <p:ph type="ftr" sz="quarter" idx="11"/>
+          </p:nvPr>
+        </p:nvSpPr>
+        <p:spPr/>
+        <p:txBody>
+          <a:bodyPr/>
+          <a:lstStyle/>
+          <a:p>
+            <a:r>
+              <a:rPr lang="de-DE"/>
+              <a:t>Application Project "Umsatzprognose Bäckerei"</a:t>
+            </a:r>
+          </a:p>
+        </p:txBody>
+      </p:sp>
+      <p:sp>
+        <p:nvSpPr>
+          <p:cNvPr id="5" name="Foliennummernplatzhalter 4">
+            <a:extLst>
+              <a:ext uri="{FF2B5EF4-FFF2-40B4-BE49-F238E27FC236}">
+                <a16:creationId xmlns:a16="http://schemas.microsoft.com/office/drawing/2014/main" id="{3B37C111-C299-456C-AE5F-E0E6F2CA0C65}"/>
+              </a:ext>
+            </a:extLst>
+          </p:cNvPr>
+          <p:cNvSpPr>
+            <a:spLocks noGrp="1"/>
+          </p:cNvSpPr>
+          <p:nvPr>
+            <p:ph type="sldNum" sz="quarter" idx="12"/>
+          </p:nvPr>
+        </p:nvSpPr>
+        <p:spPr/>
+        <p:txBody>
+          <a:bodyPr/>
+          <a:lstStyle/>
+          <a:p>
+            <a:fld id="{9C75FA27-ABA3-44D1-A3BB-EAEC5689F51E}" type="slidenum">
+              <a:rPr lang="de-DE" smtClean="0"/>
+              <a:t>23</a:t>
+            </a:fld>
+            <a:endParaRPr lang="de-DE"/>
+          </a:p>
+        </p:txBody>
+      </p:sp>
+      <p:pic>
+        <p:nvPicPr>
+          <p:cNvPr id="2" name="Grafik 1">
+            <a:extLst>
+              <a:ext uri="{FF2B5EF4-FFF2-40B4-BE49-F238E27FC236}">
+                <a16:creationId xmlns:a16="http://schemas.microsoft.com/office/drawing/2014/main" id="{E3FF49E8-B53B-4277-91D2-56F085FDD7CE}"/>
+              </a:ext>
+            </a:extLst>
+          </p:cNvPr>
+          <p:cNvPicPr>
+            <a:picLocks noChangeAspect="1"/>
+          </p:cNvPicPr>
+          <p:nvPr/>
+        </p:nvPicPr>
+        <p:blipFill>
+          <a:blip r:embed="rId2"/>
+          <a:stretch>
+            <a:fillRect/>
+          </a:stretch>
+        </p:blipFill>
+        <p:spPr>
+          <a:xfrm>
+            <a:off x="1583923" y="539447"/>
+            <a:ext cx="9226951" cy="5908977"/>
+          </a:xfrm>
+          <a:prstGeom prst="rect">
+            <a:avLst/>
+          </a:prstGeom>
+        </p:spPr>
+      </p:pic>
+      <p:sp>
+        <p:nvSpPr>
+          <p:cNvPr id="9" name="Titel 1">
+            <a:extLst>
+              <a:ext uri="{FF2B5EF4-FFF2-40B4-BE49-F238E27FC236}">
+                <a16:creationId xmlns:a16="http://schemas.microsoft.com/office/drawing/2014/main" id="{605F0B5C-04B5-4DC7-AB62-259843635722}"/>
+              </a:ext>
+            </a:extLst>
+          </p:cNvPr>
+          <p:cNvSpPr>
+            <a:spLocks noGrp="1"/>
+          </p:cNvSpPr>
+          <p:nvPr>
+            <p:ph type="title"/>
+          </p:nvPr>
+        </p:nvSpPr>
+        <p:spPr>
+          <a:xfrm>
+            <a:off x="92476" y="1"/>
+            <a:ext cx="10515600" cy="976544"/>
+          </a:xfrm>
+        </p:spPr>
+        <p:txBody>
+          <a:bodyPr/>
+          <a:lstStyle/>
+          <a:p>
+            <a:r>
+              <a:rPr lang="de-DE" dirty="0"/>
+              <a:t>Anhang</a:t>
+            </a:r>
+          </a:p>
+        </p:txBody>
+      </p:sp>
+    </p:spTree>
+    <p:extLst>
+      <p:ext uri="{BB962C8B-B14F-4D97-AF65-F5344CB8AC3E}">
+        <p14:creationId xmlns:p14="http://schemas.microsoft.com/office/powerpoint/2010/main" val="3997722087"/>
+      </p:ext>
+    </p:extLst>
+  </p:cSld>
+  <p:clrMapOvr>
+    <a:masterClrMapping/>
+  </p:clrMapOvr>
+</p:sld>
+</file>
+
+<file path=ppt/slides/slide24.xml><?xml version="1.0" encoding="utf-8"?>
+<p:sld xmlns:a="http://schemas.openxmlformats.org/drawingml/2006/main" xmlns:r="http://schemas.openxmlformats.org/officeDocument/2006/relationships" xmlns:p="http://schemas.openxmlformats.org/presentationml/2006/main">
+  <p:cSld>
+    <p:spTree>
+      <p:nvGrpSpPr>
+        <p:cNvPr id="1" name=""/>
+        <p:cNvGrpSpPr/>
+        <p:nvPr/>
+      </p:nvGrpSpPr>
+      <p:grpSpPr>
+        <a:xfrm>
+          <a:off x="0" y="0"/>
+          <a:ext cx="0" cy="0"/>
+          <a:chOff x="0" y="0"/>
+          <a:chExt cx="0" cy="0"/>
+        </a:xfrm>
+      </p:grpSpPr>
+      <p:sp>
+        <p:nvSpPr>
+          <p:cNvPr id="4" name="Fußzeilenplatzhalter 3">
+            <a:extLst>
+              <a:ext uri="{FF2B5EF4-FFF2-40B4-BE49-F238E27FC236}">
+                <a16:creationId xmlns:a16="http://schemas.microsoft.com/office/drawing/2014/main" id="{16F63B71-9DCA-4E29-A33C-A5817A2E808C}"/>
+              </a:ext>
+            </a:extLst>
+          </p:cNvPr>
+          <p:cNvSpPr>
+            <a:spLocks noGrp="1"/>
+          </p:cNvSpPr>
+          <p:nvPr>
+            <p:ph type="ftr" sz="quarter" idx="11"/>
+          </p:nvPr>
+        </p:nvSpPr>
+        <p:spPr/>
+        <p:txBody>
+          <a:bodyPr/>
+          <a:lstStyle/>
+          <a:p>
+            <a:r>
+              <a:rPr lang="de-DE"/>
+              <a:t>Application Project "Umsatzprognose Bäckerei"</a:t>
+            </a:r>
+          </a:p>
+        </p:txBody>
+      </p:sp>
+      <p:sp>
+        <p:nvSpPr>
+          <p:cNvPr id="5" name="Foliennummernplatzhalter 4">
+            <a:extLst>
+              <a:ext uri="{FF2B5EF4-FFF2-40B4-BE49-F238E27FC236}">
+                <a16:creationId xmlns:a16="http://schemas.microsoft.com/office/drawing/2014/main" id="{3B37C111-C299-456C-AE5F-E0E6F2CA0C65}"/>
+              </a:ext>
+            </a:extLst>
+          </p:cNvPr>
+          <p:cNvSpPr>
+            <a:spLocks noGrp="1"/>
+          </p:cNvSpPr>
+          <p:nvPr>
+            <p:ph type="sldNum" sz="quarter" idx="12"/>
+          </p:nvPr>
+        </p:nvSpPr>
+        <p:spPr/>
+        <p:txBody>
+          <a:bodyPr/>
+          <a:lstStyle/>
+          <a:p>
+            <a:fld id="{9C75FA27-ABA3-44D1-A3BB-EAEC5689F51E}" type="slidenum">
+              <a:rPr lang="de-DE" smtClean="0"/>
+              <a:t>24</a:t>
+            </a:fld>
+            <a:endParaRPr lang="de-DE"/>
+          </a:p>
+        </p:txBody>
+      </p:sp>
+      <p:sp>
+        <p:nvSpPr>
+          <p:cNvPr id="9" name="Titel 1">
+            <a:extLst>
+              <a:ext uri="{FF2B5EF4-FFF2-40B4-BE49-F238E27FC236}">
+                <a16:creationId xmlns:a16="http://schemas.microsoft.com/office/drawing/2014/main" id="{605F0B5C-04B5-4DC7-AB62-259843635722}"/>
+              </a:ext>
+            </a:extLst>
+          </p:cNvPr>
+          <p:cNvSpPr>
+            <a:spLocks noGrp="1"/>
+          </p:cNvSpPr>
+          <p:nvPr>
+            <p:ph type="title"/>
+          </p:nvPr>
+        </p:nvSpPr>
+        <p:spPr>
+          <a:xfrm>
+            <a:off x="92476" y="1"/>
+            <a:ext cx="10515600" cy="976544"/>
+          </a:xfrm>
+        </p:spPr>
+        <p:txBody>
           <a:bodyPr/>
           <a:lstStyle/>
           <a:p>
@@ -6011,6 +7115,65 @@
           </a:prstGeom>
         </p:spPr>
       </p:pic>
+      <p:sp>
+        <p:nvSpPr>
+          <p:cNvPr id="7" name="Interaktive Schaltfläche: Nächste(r) oder Weiter 6">
+            <a:hlinkClick r:id="rId3" action="ppaction://hlinksldjump" highlightClick="1"/>
+            <a:extLst>
+              <a:ext uri="{FF2B5EF4-FFF2-40B4-BE49-F238E27FC236}">
+                <a16:creationId xmlns:a16="http://schemas.microsoft.com/office/drawing/2014/main" id="{E99D689E-039D-4AE0-A2BB-FE556AA80124}"/>
+              </a:ext>
+            </a:extLst>
+          </p:cNvPr>
+          <p:cNvSpPr/>
+          <p:nvPr/>
+        </p:nvSpPr>
+        <p:spPr>
+          <a:xfrm>
+            <a:off x="381000" y="6180509"/>
+            <a:ext cx="457200" cy="365125"/>
+          </a:xfrm>
+          <a:prstGeom prst="actionButtonForwardNext">
+            <a:avLst/>
+          </a:prstGeom>
+          <a:solidFill>
+            <a:schemeClr val="bg1">
+              <a:lumMod val="85000"/>
+            </a:schemeClr>
+          </a:solidFill>
+          <a:ln>
+            <a:solidFill>
+              <a:schemeClr val="bg2">
+                <a:lumMod val="90000"/>
+              </a:schemeClr>
+            </a:solidFill>
+          </a:ln>
+        </p:spPr>
+        <p:style>
+          <a:lnRef idx="2">
+            <a:schemeClr val="accent1">
+              <a:shade val="50000"/>
+            </a:schemeClr>
+          </a:lnRef>
+          <a:fillRef idx="1">
+            <a:schemeClr val="accent1"/>
+          </a:fillRef>
+          <a:effectRef idx="0">
+            <a:schemeClr val="accent1"/>
+          </a:effectRef>
+          <a:fontRef idx="minor">
+            <a:schemeClr val="lt1"/>
+          </a:fontRef>
+        </p:style>
+        <p:txBody>
+          <a:bodyPr rtlCol="0" anchor="ctr"/>
+          <a:lstStyle/>
+          <a:p>
+            <a:pPr algn="ctr"/>
+            <a:endParaRPr lang="de-DE"/>
+          </a:p>
+        </p:txBody>
+      </p:sp>
     </p:spTree>
     <p:extLst>
       <p:ext uri="{BB962C8B-B14F-4D97-AF65-F5344CB8AC3E}">
@@ -6558,7 +7721,7 @@
               <a:rPr lang="de-DE" smtClean="0"/>
               <a:t>4</a:t>
             </a:fld>
-            <a:endParaRPr lang="de-DE"/>
+            <a:endParaRPr lang="de-DE" dirty="0"/>
           </a:p>
         </p:txBody>
       </p:sp>
@@ -6608,8 +7771,8 @@
         </p:nvSpPr>
         <p:spPr>
           <a:xfrm>
-            <a:off x="838200" y="4280178"/>
-            <a:ext cx="8204154" cy="2441297"/>
+            <a:off x="838199" y="4280178"/>
+            <a:ext cx="8786567" cy="2441297"/>
           </a:xfrm>
           <a:prstGeom prst="rect">
             <a:avLst/>
@@ -6810,7 +7973,7 @@
           <a:p>
             <a:r>
               <a:rPr lang="de-DE" sz="2600" dirty="0"/>
-              <a:t>Und wir haben </a:t>
+              <a:t>Als weitere </a:t>
             </a:r>
             <a:r>
               <a:rPr lang="de-DE" sz="2600" b="1" dirty="0"/>
@@ -6818,7 +7981,7 @@
             </a:r>
             <a:r>
               <a:rPr lang="de-DE" sz="2600" dirty="0"/>
-              <a:t>identifiziert: Ferien, Feiertage</a:t>
+              <a:t>haben wir identifiziert: Ferien, Feiertage, Jahreszeiten</a:t>
             </a:r>
           </a:p>
         </p:txBody>
@@ -7931,12 +9094,100 @@
           <a:lstStyle/>
           <a:p>
             <a:r>
+              <a:rPr lang="de-DE" dirty="0"/>
+              <a:t>Anwendung</a:t>
+            </a:r>
+            <a:r>
               <a:rPr lang="de-DE" b="1" dirty="0"/>
-              <a:t>Beste Teilmenge </a:t>
-            </a:r>
-            <a:r>
-              <a:rPr lang="de-DE" dirty="0"/>
-              <a:t>an Regressoren („Best </a:t>
+              <a:t> </a:t>
+            </a:r>
+            <a:r>
+              <a:rPr lang="de-DE" dirty="0"/>
+              <a:t>von</a:t>
+            </a:r>
+            <a:r>
+              <a:rPr lang="de-DE" b="1" dirty="0"/>
+              <a:t> multiplen Regressionsmodellen</a:t>
+            </a:r>
+          </a:p>
+          <a:p>
+            <a:r>
+              <a:rPr lang="de-DE" b="1" dirty="0"/>
+              <a:t>Mehrstufiges Vorgehen:</a:t>
+            </a:r>
+          </a:p>
+          <a:p>
+            <a:pPr marL="914400" lvl="1" indent="-457200">
+              <a:buFont typeface="+mj-lt"/>
+              <a:buAutoNum type="arabicPeriod"/>
+            </a:pPr>
+            <a:r>
+              <a:rPr lang="de-DE" dirty="0"/>
+              <a:t>Einteilung der Daten in </a:t>
+            </a:r>
+            <a:r>
+              <a:rPr lang="de-DE" b="1" dirty="0"/>
+              <a:t>Trainings- und Testdatensatz </a:t>
+            </a:r>
+            <a:r>
+              <a:rPr lang="de-DE" dirty="0"/>
+              <a:t>sowie</a:t>
+            </a:r>
+            <a:r>
+              <a:rPr lang="de-DE" b="1" dirty="0"/>
+              <a:t> Überprüfung </a:t>
+            </a:r>
+            <a:r>
+              <a:rPr lang="de-DE" dirty="0"/>
+              <a:t>der Variablen auf</a:t>
+            </a:r>
+            <a:r>
+              <a:rPr lang="de-DE" b="1" dirty="0"/>
+              <a:t> lineare Abhängigkeit </a:t>
+            </a:r>
+            <a:r>
+              <a:rPr lang="de-DE" dirty="0"/>
+              <a:t>und</a:t>
+            </a:r>
+            <a:r>
+              <a:rPr lang="de-DE" b="1" dirty="0"/>
+              <a:t> Multikollinearität</a:t>
+            </a:r>
+          </a:p>
+          <a:p>
+            <a:pPr marL="914400" lvl="1" indent="-457200">
+              <a:buFont typeface="+mj-lt"/>
+              <a:buAutoNum type="arabicPeriod"/>
+            </a:pPr>
+            <a:r>
+              <a:rPr lang="de-DE" b="1" dirty="0"/>
+              <a:t>Auswahl </a:t>
+            </a:r>
+            <a:r>
+              <a:rPr lang="de-DE" dirty="0"/>
+              <a:t>der in die Modelle </a:t>
+            </a:r>
+            <a:r>
+              <a:rPr lang="de-DE" b="1" dirty="0"/>
+              <a:t>aufzunehmenden Variablen </a:t>
+            </a:r>
+            <a:r>
+              <a:rPr lang="de-DE" dirty="0"/>
+              <a:t>(je Warengruppe)</a:t>
+            </a:r>
+          </a:p>
+          <a:p>
+            <a:pPr marL="1371600" lvl="2" indent="-457200">
+              <a:buFont typeface="+mj-lt"/>
+              <a:buAutoNum type="alphaLcParenR"/>
+            </a:pPr>
+            <a:r>
+              <a:rPr lang="de-DE" b="1" dirty="0"/>
+              <a:t>Beste Teilmengenauswahl </a:t>
+            </a:r>
+            <a:r>
+              <a:rPr lang="de-DE" dirty="0"/>
+              <a:t>(„Best </a:t>
             </a:r>
             <a:r>
               <a:rPr lang="de-DE" dirty="0" err="1"/>
@@ -7956,6 +9207,10 @@
             </a:r>
           </a:p>
           <a:p>
+            <a:pPr marL="1371600" lvl="2" indent="-457200">
+              <a:buFont typeface="+mj-lt"/>
+              <a:buAutoNum type="alphaLcParenR"/>
+            </a:pPr>
             <a:r>
               <a:rPr lang="de-DE" b="1" dirty="0"/>
               <a:t>Schrittweise Auswahl </a:t>
@@ -7978,30 +9233,359 @@
             </a:r>
             <a:r>
               <a:rPr lang="de-DE" dirty="0"/>
-              <a:t>“)</a:t>
-            </a:r>
-          </a:p>
-          <a:p>
-            <a:pPr lvl="1"/>
+              <a:t>“): </a:t>
+            </a:r>
             <a:r>
               <a:rPr lang="de-DE" dirty="0" err="1"/>
               <a:t>forward</a:t>
             </a:r>
             <a:r>
               <a:rPr lang="de-DE" dirty="0"/>
-              <a:t> vs. </a:t>
+              <a:t> and </a:t>
             </a:r>
             <a:r>
               <a:rPr lang="de-DE" dirty="0" err="1"/>
-              <a:t>Backward</a:t>
+              <a:t>backward</a:t>
             </a:r>
             <a:endParaRPr lang="de-DE" dirty="0"/>
           </a:p>
           <a:p>
-            <a:r>
-              <a:rPr lang="de-DE" dirty="0"/>
-              <a:t>…</a:t>
-            </a:r>
+            <a:pPr marL="914400" lvl="1" indent="-457200">
+              <a:buFont typeface="+mj-lt"/>
+              <a:buAutoNum type="arabicPeriod"/>
+            </a:pPr>
+            <a:r>
+              <a:rPr lang="de-DE" dirty="0"/>
+              <a:t>Erstellung von Regressionsmodellen (je Warengruppe)</a:t>
+            </a:r>
+          </a:p>
+          <a:p>
+            <a:pPr marL="914400" lvl="1" indent="-457200">
+              <a:buFont typeface="+mj-lt"/>
+              <a:buAutoNum type="arabicPeriod"/>
+            </a:pPr>
+            <a:r>
+              <a:rPr lang="de-DE" dirty="0"/>
+              <a:t>Auswahl des jeweils besten Modells anhand vordefinierter Gütekennzahlen </a:t>
+            </a:r>
+          </a:p>
+        </p:txBody>
+      </p:sp>
+      <p:sp>
+        <p:nvSpPr>
+          <p:cNvPr id="8" name="Interaktive Schaltfläche: Nächste(r) oder Weiter 7">
+            <a:hlinkClick r:id="rId3" action="ppaction://hlinksldjump" highlightClick="1"/>
+            <a:extLst>
+              <a:ext uri="{FF2B5EF4-FFF2-40B4-BE49-F238E27FC236}">
+                <a16:creationId xmlns:a16="http://schemas.microsoft.com/office/drawing/2014/main" id="{50D1B559-C9DE-4469-B9A6-34403D1D29FC}"/>
+              </a:ext>
+            </a:extLst>
+          </p:cNvPr>
+          <p:cNvSpPr/>
+          <p:nvPr/>
+        </p:nvSpPr>
+        <p:spPr>
+          <a:xfrm>
+            <a:off x="7813431" y="3938954"/>
+            <a:ext cx="339969" cy="244902"/>
+          </a:xfrm>
+          <a:prstGeom prst="actionButtonForwardNext">
+            <a:avLst/>
+          </a:prstGeom>
+          <a:solidFill>
+            <a:schemeClr val="bg1">
+              <a:lumMod val="85000"/>
+            </a:schemeClr>
+          </a:solidFill>
+          <a:ln>
+            <a:solidFill>
+              <a:schemeClr val="bg2">
+                <a:lumMod val="90000"/>
+              </a:schemeClr>
+            </a:solidFill>
+          </a:ln>
+        </p:spPr>
+        <p:style>
+          <a:lnRef idx="2">
+            <a:schemeClr val="accent1">
+              <a:shade val="50000"/>
+            </a:schemeClr>
+          </a:lnRef>
+          <a:fillRef idx="1">
+            <a:schemeClr val="accent1"/>
+          </a:fillRef>
+          <a:effectRef idx="0">
+            <a:schemeClr val="accent1"/>
+          </a:effectRef>
+          <a:fontRef idx="minor">
+            <a:schemeClr val="lt1"/>
+          </a:fontRef>
+        </p:style>
+        <p:txBody>
+          <a:bodyPr rtlCol="0" anchor="ctr"/>
+          <a:lstStyle/>
+          <a:p>
+            <a:pPr algn="ctr"/>
+            <a:endParaRPr lang="de-DE"/>
+          </a:p>
+        </p:txBody>
+      </p:sp>
+      <p:sp>
+        <p:nvSpPr>
+          <p:cNvPr id="9" name="Interaktive Schaltfläche: Nächste(r) oder Weiter 8">
+            <a:hlinkClick r:id="rId4" action="ppaction://hlinksldjump" highlightClick="1"/>
+            <a:extLst>
+              <a:ext uri="{FF2B5EF4-FFF2-40B4-BE49-F238E27FC236}">
+                <a16:creationId xmlns:a16="http://schemas.microsoft.com/office/drawing/2014/main" id="{93F49670-E424-412B-94B5-0B879EF9F9B7}"/>
+              </a:ext>
+            </a:extLst>
+          </p:cNvPr>
+          <p:cNvSpPr/>
+          <p:nvPr/>
+        </p:nvSpPr>
+        <p:spPr>
+          <a:xfrm>
+            <a:off x="9525001" y="4278924"/>
+            <a:ext cx="339969" cy="244902"/>
+          </a:xfrm>
+          <a:prstGeom prst="actionButtonForwardNext">
+            <a:avLst/>
+          </a:prstGeom>
+          <a:solidFill>
+            <a:schemeClr val="bg1">
+              <a:lumMod val="85000"/>
+            </a:schemeClr>
+          </a:solidFill>
+          <a:ln>
+            <a:solidFill>
+              <a:schemeClr val="bg2">
+                <a:lumMod val="90000"/>
+              </a:schemeClr>
+            </a:solidFill>
+          </a:ln>
+        </p:spPr>
+        <p:style>
+          <a:lnRef idx="2">
+            <a:schemeClr val="accent1">
+              <a:shade val="50000"/>
+            </a:schemeClr>
+          </a:lnRef>
+          <a:fillRef idx="1">
+            <a:schemeClr val="accent1"/>
+          </a:fillRef>
+          <a:effectRef idx="0">
+            <a:schemeClr val="accent1"/>
+          </a:effectRef>
+          <a:fontRef idx="minor">
+            <a:schemeClr val="lt1"/>
+          </a:fontRef>
+        </p:style>
+        <p:txBody>
+          <a:bodyPr rtlCol="0" anchor="ctr"/>
+          <a:lstStyle/>
+          <a:p>
+            <a:pPr algn="ctr"/>
+            <a:endParaRPr lang="de-DE"/>
+          </a:p>
+        </p:txBody>
+      </p:sp>
+      <p:sp>
+        <p:nvSpPr>
+          <p:cNvPr id="11" name="Interaktive Schaltfläche: Nächste(r) oder Weiter 10">
+            <a:hlinkClick r:id="rId5" action="ppaction://hlinksldjump" highlightClick="1"/>
+            <a:extLst>
+              <a:ext uri="{FF2B5EF4-FFF2-40B4-BE49-F238E27FC236}">
+                <a16:creationId xmlns:a16="http://schemas.microsoft.com/office/drawing/2014/main" id="{236D4263-74A5-4796-BAB0-169C7A255F7B}"/>
+              </a:ext>
+            </a:extLst>
+          </p:cNvPr>
+          <p:cNvSpPr/>
+          <p:nvPr/>
+        </p:nvSpPr>
+        <p:spPr>
+          <a:xfrm>
+            <a:off x="10007846" y="4278924"/>
+            <a:ext cx="339969" cy="244902"/>
+          </a:xfrm>
+          <a:prstGeom prst="actionButtonForwardNext">
+            <a:avLst/>
+          </a:prstGeom>
+          <a:solidFill>
+            <a:schemeClr val="bg1">
+              <a:lumMod val="85000"/>
+            </a:schemeClr>
+          </a:solidFill>
+          <a:ln>
+            <a:solidFill>
+              <a:schemeClr val="bg2">
+                <a:lumMod val="90000"/>
+              </a:schemeClr>
+            </a:solidFill>
+          </a:ln>
+        </p:spPr>
+        <p:style>
+          <a:lnRef idx="2">
+            <a:schemeClr val="accent1">
+              <a:shade val="50000"/>
+            </a:schemeClr>
+          </a:lnRef>
+          <a:fillRef idx="1">
+            <a:schemeClr val="accent1"/>
+          </a:fillRef>
+          <a:effectRef idx="0">
+            <a:schemeClr val="accent1"/>
+          </a:effectRef>
+          <a:fontRef idx="minor">
+            <a:schemeClr val="lt1"/>
+          </a:fontRef>
+        </p:style>
+        <p:txBody>
+          <a:bodyPr rtlCol="0" anchor="ctr"/>
+          <a:lstStyle/>
+          <a:p>
+            <a:pPr algn="ctr"/>
+            <a:endParaRPr lang="de-DE"/>
+          </a:p>
+        </p:txBody>
+      </p:sp>
+      <p:pic>
+        <p:nvPicPr>
+          <p:cNvPr id="12" name="Grafik 11">
+            <a:extLst>
+              <a:ext uri="{FF2B5EF4-FFF2-40B4-BE49-F238E27FC236}">
+                <a16:creationId xmlns:a16="http://schemas.microsoft.com/office/drawing/2014/main" id="{F28516E8-DD04-48B8-BBE8-49F88BD726AF}"/>
+              </a:ext>
+            </a:extLst>
+          </p:cNvPr>
+          <p:cNvPicPr>
+            <a:picLocks noChangeAspect="1"/>
+          </p:cNvPicPr>
+          <p:nvPr/>
+        </p:nvPicPr>
+        <p:blipFill>
+          <a:blip r:embed="rId6"/>
+          <a:stretch>
+            <a:fillRect/>
+          </a:stretch>
+        </p:blipFill>
+        <p:spPr>
+          <a:xfrm>
+            <a:off x="633826" y="5486400"/>
+            <a:ext cx="11163922" cy="1233958"/>
+          </a:xfrm>
+          <a:prstGeom prst="rect">
+            <a:avLst/>
+          </a:prstGeom>
+        </p:spPr>
+      </p:pic>
+      <p:sp>
+        <p:nvSpPr>
+          <p:cNvPr id="6" name="Rechteck 5">
+            <a:extLst>
+              <a:ext uri="{FF2B5EF4-FFF2-40B4-BE49-F238E27FC236}">
+                <a16:creationId xmlns:a16="http://schemas.microsoft.com/office/drawing/2014/main" id="{19B05EF4-5BBE-4795-816C-F39D45868157}"/>
+              </a:ext>
+            </a:extLst>
+          </p:cNvPr>
+          <p:cNvSpPr/>
+          <p:nvPr/>
+        </p:nvSpPr>
+        <p:spPr>
+          <a:xfrm>
+            <a:off x="7219632" y="5485283"/>
+            <a:ext cx="721733" cy="1235076"/>
+          </a:xfrm>
+          <a:prstGeom prst="rect">
+            <a:avLst/>
+          </a:prstGeom>
+          <a:noFill/>
+          <a:ln w="19050">
+            <a:solidFill>
+              <a:srgbClr val="C00000"/>
+            </a:solidFill>
+          </a:ln>
+        </p:spPr>
+        <p:style>
+          <a:lnRef idx="2">
+            <a:schemeClr val="accent1">
+              <a:shade val="50000"/>
+            </a:schemeClr>
+          </a:lnRef>
+          <a:fillRef idx="1">
+            <a:schemeClr val="accent1"/>
+          </a:fillRef>
+          <a:effectRef idx="0">
+            <a:schemeClr val="accent1"/>
+          </a:effectRef>
+          <a:fontRef idx="minor">
+            <a:schemeClr val="lt1"/>
+          </a:fontRef>
+        </p:style>
+        <p:txBody>
+          <a:bodyPr rtlCol="0" anchor="ctr"/>
+          <a:lstStyle/>
+          <a:p>
+            <a:pPr algn="ctr"/>
+            <a:endParaRPr lang="de-DE"/>
+          </a:p>
+        </p:txBody>
+      </p:sp>
+      <p:sp>
+        <p:nvSpPr>
+          <p:cNvPr id="13" name="Interaktive Schaltfläche: Nächste(r) oder Weiter 12">
+            <a:hlinkClick r:id="rId7" action="ppaction://hlinksldjump" highlightClick="1"/>
+            <a:extLst>
+              <a:ext uri="{FF2B5EF4-FFF2-40B4-BE49-F238E27FC236}">
+                <a16:creationId xmlns:a16="http://schemas.microsoft.com/office/drawing/2014/main" id="{7DC01CE4-C116-4029-B593-B2D9AE7E32C5}"/>
+              </a:ext>
+            </a:extLst>
+          </p:cNvPr>
+          <p:cNvSpPr/>
+          <p:nvPr/>
+        </p:nvSpPr>
+        <p:spPr>
+          <a:xfrm>
+            <a:off x="11235804" y="5048227"/>
+            <a:ext cx="339969" cy="244902"/>
+          </a:xfrm>
+          <a:prstGeom prst="actionButtonForwardNext">
+            <a:avLst/>
+          </a:prstGeom>
+          <a:solidFill>
+            <a:schemeClr val="bg1">
+              <a:lumMod val="85000"/>
+            </a:schemeClr>
+          </a:solidFill>
+          <a:ln>
+            <a:solidFill>
+              <a:schemeClr val="bg2">
+                <a:lumMod val="90000"/>
+              </a:schemeClr>
+            </a:solidFill>
+          </a:ln>
+        </p:spPr>
+        <p:style>
+          <a:lnRef idx="2">
+            <a:schemeClr val="accent1">
+              <a:shade val="50000"/>
+            </a:schemeClr>
+          </a:lnRef>
+          <a:fillRef idx="1">
+            <a:schemeClr val="accent1"/>
+          </a:fillRef>
+          <a:effectRef idx="0">
+            <a:schemeClr val="accent1"/>
+          </a:effectRef>
+          <a:fontRef idx="minor">
+            <a:schemeClr val="lt1"/>
+          </a:fontRef>
+        </p:style>
+        <p:txBody>
+          <a:bodyPr rtlCol="0" anchor="ctr"/>
+          <a:lstStyle/>
+          <a:p>
+            <a:pPr algn="ctr"/>
+            <a:endParaRPr lang="de-DE"/>
           </a:p>
         </p:txBody>
       </p:sp>
@@ -8157,7 +9741,7 @@
     </p:spTree>
     <p:extLst>
       <p:ext uri="{BB962C8B-B14F-4D97-AF65-F5344CB8AC3E}">
-        <p14:creationId xmlns:p14="http://schemas.microsoft.com/office/powerpoint/2010/main" val="2116034065"/>
+        <p14:creationId xmlns:p14="http://schemas.microsoft.com/office/powerpoint/2010/main" val="1110697242"/>
       </p:ext>
     </p:extLst>
   </p:cSld>
@@ -8662,6 +10246,65 @@
               <a:buNone/>
             </a:pPr>
             <a:endParaRPr lang="de-DE" dirty="0"/>
+          </a:p>
+        </p:txBody>
+      </p:sp>
+      <p:sp>
+        <p:nvSpPr>
+          <p:cNvPr id="8" name="Interaktive Schaltfläche: Nächste(r) oder Weiter 7">
+            <a:hlinkClick r:id="rId5" action="ppaction://hlinksldjump" highlightClick="1"/>
+            <a:extLst>
+              <a:ext uri="{FF2B5EF4-FFF2-40B4-BE49-F238E27FC236}">
+                <a16:creationId xmlns:a16="http://schemas.microsoft.com/office/drawing/2014/main" id="{C3515AA0-4901-47D4-A037-3046B0899298}"/>
+              </a:ext>
+            </a:extLst>
+          </p:cNvPr>
+          <p:cNvSpPr/>
+          <p:nvPr/>
+        </p:nvSpPr>
+        <p:spPr>
+          <a:xfrm>
+            <a:off x="381000" y="6180509"/>
+            <a:ext cx="457200" cy="365125"/>
+          </a:xfrm>
+          <a:prstGeom prst="actionButtonForwardNext">
+            <a:avLst/>
+          </a:prstGeom>
+          <a:solidFill>
+            <a:schemeClr val="bg1">
+              <a:lumMod val="85000"/>
+            </a:schemeClr>
+          </a:solidFill>
+          <a:ln>
+            <a:solidFill>
+              <a:schemeClr val="bg2">
+                <a:lumMod val="90000"/>
+              </a:schemeClr>
+            </a:solidFill>
+          </a:ln>
+        </p:spPr>
+        <p:style>
+          <a:lnRef idx="2">
+            <a:schemeClr val="accent1">
+              <a:shade val="50000"/>
+            </a:schemeClr>
+          </a:lnRef>
+          <a:fillRef idx="1">
+            <a:schemeClr val="accent1"/>
+          </a:fillRef>
+          <a:effectRef idx="0">
+            <a:schemeClr val="accent1"/>
+          </a:effectRef>
+          <a:fontRef idx="minor">
+            <a:schemeClr val="lt1"/>
+          </a:fontRef>
+        </p:style>
+        <p:txBody>
+          <a:bodyPr rtlCol="0" anchor="ctr"/>
+          <a:lstStyle/>
+          <a:p>
+            <a:pPr algn="ctr"/>
+            <a:endParaRPr lang="de-DE"/>
           </a:p>
         </p:txBody>
       </p:sp>

</xml_diff>

<commit_message>
Aktuelles geknittetes Rmd-file + Schönheitskorrekturen Präsi
</commit_message>
<xml_diff>
--- a/ApplicationProject_UmsatzprognoseBäckerei_v2.pptx
+++ b/ApplicationProject_UmsatzprognoseBäckerei_v2.pptx
@@ -9112,7 +9112,7 @@
           </a:p>
           <a:p>
             <a:r>
-              <a:rPr lang="de-DE" b="1" dirty="0"/>
+              <a:rPr lang="de-DE" dirty="0"/>
               <a:t>Mehrstufiges Vorgehen:</a:t>
             </a:r>
           </a:p>
@@ -9256,7 +9256,15 @@
             </a:pPr>
             <a:r>
               <a:rPr lang="de-DE" dirty="0"/>
-              <a:t>Erstellung von Regressionsmodellen (je Warengruppe)</a:t>
+              <a:t>Erstellung von </a:t>
+            </a:r>
+            <a:r>
+              <a:rPr lang="de-DE" b="1" dirty="0"/>
+              <a:t>Regressionsmodellen</a:t>
+            </a:r>
+            <a:r>
+              <a:rPr lang="de-DE" dirty="0"/>
+              <a:t> (je Warengruppe)</a:t>
             </a:r>
           </a:p>
           <a:p>
@@ -9265,8 +9273,20 @@
               <a:buAutoNum type="arabicPeriod"/>
             </a:pPr>
             <a:r>
-              <a:rPr lang="de-DE" dirty="0"/>
-              <a:t>Auswahl des jeweils besten Modells anhand vordefinierter Gütekennzahlen </a:t>
+              <a:rPr lang="de-DE" b="1" dirty="0"/>
+              <a:t>Auswahl</a:t>
+            </a:r>
+            <a:r>
+              <a:rPr lang="de-DE" dirty="0"/>
+              <a:t> des jeweils </a:t>
+            </a:r>
+            <a:r>
+              <a:rPr lang="de-DE" b="1" dirty="0"/>
+              <a:t>besten Modells </a:t>
+            </a:r>
+            <a:r>
+              <a:rPr lang="de-DE" dirty="0"/>
+              <a:t>anhand vordefinierter Gütekennzahlen </a:t>
             </a:r>
           </a:p>
         </p:txBody>

</xml_diff>